<commit_message>
Small update to include initial findings
</commit_message>
<xml_diff>
--- a/Team_BAMF_Airport_Delays_During_Shutdown.pptx
+++ b/Team_BAMF_Airport_Delays_During_Shutdown.pptx
@@ -5,7 +5,7 @@
     <p:sldMasterId id="2147483648" r:id="rId1"/>
   </p:sldMasterIdLst>
   <p:notesMasterIdLst>
-    <p:notesMasterId r:id="rId16"/>
+    <p:notesMasterId r:id="rId17"/>
   </p:notesMasterIdLst>
   <p:sldIdLst>
     <p:sldId id="258" r:id="rId2"/>
@@ -21,7 +21,8 @@
     <p:sldId id="274" r:id="rId12"/>
     <p:sldId id="275" r:id="rId13"/>
     <p:sldId id="270" r:id="rId14"/>
-    <p:sldId id="263" r:id="rId15"/>
+    <p:sldId id="276" r:id="rId15"/>
+    <p:sldId id="263" r:id="rId16"/>
   </p:sldIdLst>
   <p:sldSz cx="12192000" cy="6858000"/>
   <p:notesSz cx="6858000" cy="9144000"/>
@@ -210,7 +211,7 @@
           <a:p>
             <a:fld id="{A5C20BB3-3CCB-4FE5-991B-82F6BCB48AF3}" type="datetimeFigureOut">
               <a:rPr lang="en-US" smtClean="0"/>
-              <a:t>3/5/2019</a:t>
+              <a:t>3/6/2019</a:t>
             </a:fld>
             <a:endParaRPr lang="en-US"/>
           </a:p>
@@ -845,7 +846,7 @@
             <a:fld id="{3C633830-2244-49AE-BC4A-47F415C177C6}" type="datetimeFigureOut">
               <a:rPr lang="en-US" dirty="0"/>
               <a:pPr/>
-              <a:t>3/5/2019</a:t>
+              <a:t>3/6/2019</a:t>
             </a:fld>
             <a:endParaRPr lang="en-US" dirty="0"/>
           </a:p>
@@ -1093,7 +1094,7 @@
           <a:p>
             <a:fld id="{3C633830-2244-49AE-BC4A-47F415C177C6}" type="datetimeFigureOut">
               <a:rPr lang="en-US" dirty="0"/>
-              <a:t>3/5/2019</a:t>
+              <a:t>3/6/2019</a:t>
             </a:fld>
             <a:endParaRPr lang="en-US" dirty="0"/>
           </a:p>
@@ -1479,7 +1480,7 @@
           <a:p>
             <a:fld id="{3C633830-2244-49AE-BC4A-47F415C177C6}" type="datetimeFigureOut">
               <a:rPr lang="en-US" dirty="0"/>
-              <a:t>3/5/2019</a:t>
+              <a:t>3/6/2019</a:t>
             </a:fld>
             <a:endParaRPr lang="en-US" dirty="0"/>
           </a:p>
@@ -1708,7 +1709,7 @@
           <a:p>
             <a:fld id="{3C633830-2244-49AE-BC4A-47F415C177C6}" type="datetimeFigureOut">
               <a:rPr lang="en-US" dirty="0"/>
-              <a:t>3/5/2019</a:t>
+              <a:t>3/6/2019</a:t>
             </a:fld>
             <a:endParaRPr lang="en-US" dirty="0"/>
           </a:p>
@@ -2200,7 +2201,7 @@
             <a:fld id="{3C633830-2244-49AE-BC4A-47F415C177C6}" type="datetimeFigureOut">
               <a:rPr lang="en-US" dirty="0"/>
               <a:pPr/>
-              <a:t>3/5/2019</a:t>
+              <a:t>3/6/2019</a:t>
             </a:fld>
             <a:endParaRPr lang="en-US" dirty="0"/>
           </a:p>
@@ -2511,7 +2512,7 @@
           <a:p>
             <a:fld id="{3C633830-2244-49AE-BC4A-47F415C177C6}" type="datetimeFigureOut">
               <a:rPr lang="en-US" dirty="0"/>
-              <a:t>3/5/2019</a:t>
+              <a:t>3/6/2019</a:t>
             </a:fld>
             <a:endParaRPr lang="en-US" dirty="0"/>
           </a:p>
@@ -2902,7 +2903,7 @@
           <a:p>
             <a:fld id="{3C633830-2244-49AE-BC4A-47F415C177C6}" type="datetimeFigureOut">
               <a:rPr lang="en-US" dirty="0"/>
-              <a:t>3/5/2019</a:t>
+              <a:t>3/6/2019</a:t>
             </a:fld>
             <a:endParaRPr lang="en-US" dirty="0"/>
           </a:p>
@@ -3020,7 +3021,7 @@
           <a:p>
             <a:fld id="{3C633830-2244-49AE-BC4A-47F415C177C6}" type="datetimeFigureOut">
               <a:rPr lang="en-US" dirty="0"/>
-              <a:t>3/5/2019</a:t>
+              <a:t>3/6/2019</a:t>
             </a:fld>
             <a:endParaRPr lang="en-US" dirty="0"/>
           </a:p>
@@ -3115,7 +3116,7 @@
           <a:p>
             <a:fld id="{3C633830-2244-49AE-BC4A-47F415C177C6}" type="datetimeFigureOut">
               <a:rPr lang="en-US" dirty="0"/>
-              <a:t>3/5/2019</a:t>
+              <a:t>3/6/2019</a:t>
             </a:fld>
             <a:endParaRPr lang="en-US" dirty="0"/>
           </a:p>
@@ -3415,7 +3416,7 @@
           <a:p>
             <a:fld id="{3C633830-2244-49AE-BC4A-47F415C177C6}" type="datetimeFigureOut">
               <a:rPr lang="en-US" dirty="0"/>
-              <a:t>3/5/2019</a:t>
+              <a:t>3/6/2019</a:t>
             </a:fld>
             <a:endParaRPr lang="en-US" dirty="0"/>
           </a:p>
@@ -3680,7 +3681,7 @@
           <a:p>
             <a:fld id="{3C633830-2244-49AE-BC4A-47F415C177C6}" type="datetimeFigureOut">
               <a:rPr lang="en-US" dirty="0"/>
-              <a:t>3/5/2019</a:t>
+              <a:t>3/6/2019</a:t>
             </a:fld>
             <a:endParaRPr lang="en-US" dirty="0"/>
           </a:p>
@@ -4099,7 +4100,7 @@
             <a:fld id="{3C633830-2244-49AE-BC4A-47F415C177C6}" type="datetimeFigureOut">
               <a:rPr lang="en-US" dirty="0"/>
               <a:pPr/>
-              <a:t>3/5/2019</a:t>
+              <a:t>3/6/2019</a:t>
             </a:fld>
             <a:endParaRPr lang="en-US" dirty="0"/>
           </a:p>
@@ -15372,7 +15373,7 @@
                   <a:schemeClr val="bg1"/>
                 </a:solidFill>
               </a:rPr>
-              <a:t>Findings and conclusions</a:t>
+              <a:t>Initial Findings</a:t>
             </a:r>
           </a:p>
         </p:txBody>
@@ -15643,31 +15644,676 @@
           </a:ln>
         </p:spPr>
       </p:sp>
+      <p:pic>
+        <p:nvPicPr>
+          <p:cNvPr id="8" name="Picture 2" descr="Image result for Delta boarding pass MCO">
+            <a:extLst>
+              <a:ext uri="{FF2B5EF4-FFF2-40B4-BE49-F238E27FC236}">
+                <a16:creationId xmlns:a16="http://schemas.microsoft.com/office/drawing/2014/main" id="{496395E0-D773-4FEB-8E63-F152EEB21774}"/>
+              </a:ext>
+            </a:extLst>
+          </p:cNvPr>
+          <p:cNvPicPr>
+            <a:picLocks noChangeAspect="1" noChangeArrowheads="1"/>
+          </p:cNvPicPr>
+          <p:nvPr/>
+        </p:nvPicPr>
+        <p:blipFill>
+          <a:blip r:embed="rId2">
+            <a:extLst>
+              <a:ext uri="{28A0092B-C50C-407E-A947-70E740481C1C}">
+                <a14:useLocalDpi xmlns:a14="http://schemas.microsoft.com/office/drawing/2010/main" val="0"/>
+              </a:ext>
+            </a:extLst>
+          </a:blip>
+          <a:srcRect/>
+          <a:stretch>
+            <a:fillRect/>
+          </a:stretch>
+        </p:blipFill>
+        <p:spPr bwMode="auto">
+          <a:xfrm rot="20406036">
+            <a:off x="8607841" y="430614"/>
+            <a:ext cx="2766591" cy="1402778"/>
+          </a:xfrm>
+          <a:prstGeom prst="rect">
+            <a:avLst/>
+          </a:prstGeom>
+          <a:noFill/>
+          <a:extLst>
+            <a:ext uri="{909E8E84-426E-40DD-AFC4-6F175D3DCCD1}">
+              <a14:hiddenFill xmlns:a14="http://schemas.microsoft.com/office/drawing/2010/main">
+                <a:solidFill>
+                  <a:srgbClr val="FFFFFF"/>
+                </a:solidFill>
+              </a14:hiddenFill>
+            </a:ext>
+          </a:extLst>
+        </p:spPr>
+      </p:pic>
       <p:sp>
         <p:nvSpPr>
-          <p:cNvPr id="3" name="Content Placeholder 2"/>
+          <p:cNvPr id="4" name="Rectangle 3">
+            <a:extLst>
+              <a:ext uri="{FF2B5EF4-FFF2-40B4-BE49-F238E27FC236}">
+                <a16:creationId xmlns:a16="http://schemas.microsoft.com/office/drawing/2014/main" id="{F1293546-5345-49B9-B042-1CC6074EDE38}"/>
+              </a:ext>
+            </a:extLst>
+          </p:cNvPr>
+          <p:cNvSpPr/>
+          <p:nvPr/>
+        </p:nvSpPr>
+        <p:spPr>
+          <a:xfrm>
+            <a:off x="0" y="2285999"/>
+            <a:ext cx="12191998" cy="3908762"/>
+          </a:xfrm>
+          <a:prstGeom prst="rect">
+            <a:avLst/>
+          </a:prstGeom>
+        </p:spPr>
+        <p:txBody>
+          <a:bodyPr wrap="square">
+            <a:spAutoFit/>
+          </a:bodyPr>
+          <a:lstStyle/>
+          <a:p>
+            <a:r>
+              <a:rPr lang="en-US" b="1" dirty="0"/>
+              <a:t>FIRST FACTS</a:t>
+            </a:r>
+          </a:p>
+          <a:p>
+            <a:pPr marL="342900" indent="-342900">
+              <a:buFont typeface="+mj-lt"/>
+              <a:buAutoNum type="arabicPeriod"/>
+            </a:pPr>
+            <a:r>
+              <a:rPr lang="en-US" dirty="0"/>
+              <a:t>There is a subtle increase in the number of flights comparing Date Range B to Date Range A. According to publications on Atlanta and Orlando airports, there has been a gradual increase of passengers over this period in the order of about 3%, and about 1.6% of flights. In the same reports, Delta Airlines is identified as constituting approximately 70% of all flights.</a:t>
+            </a:r>
+          </a:p>
+          <a:p>
+            <a:r>
+              <a:rPr lang="en-US" b="1" dirty="0"/>
+              <a:t>	</a:t>
+            </a:r>
+            <a:r>
+              <a:rPr lang="en-US" sz="1400" b="1" dirty="0"/>
+              <a:t>SOURCE: </a:t>
+            </a:r>
+            <a:r>
+              <a:rPr lang="en-US" sz="1400" dirty="0">
+                <a:solidFill>
+                  <a:srgbClr val="0070C0"/>
+                </a:solidFill>
+                <a:hlinkClick r:id="rId3">
+                  <a:extLst>
+                    <a:ext uri="{A12FA001-AC4F-418D-AE19-62706E023703}">
+                      <ahyp:hlinkClr xmlns:ahyp="http://schemas.microsoft.com/office/drawing/2018/hyperlinkcolor" val="tx"/>
+                    </a:ext>
+                  </a:extLst>
+                </a:hlinkClick>
+              </a:rPr>
+              <a:t>https://www.atl.com/wp-content/uploads/2018/12/ATL-Traffic-Report-Nov-2018.pdf</a:t>
+            </a:r>
+            <a:r>
+              <a:rPr lang="en-US" sz="1400" dirty="0"/>
+              <a:t> </a:t>
+            </a:r>
+          </a:p>
+          <a:p>
+            <a:r>
+              <a:rPr lang="en-US" sz="1400" b="1" dirty="0"/>
+              <a:t>	SOURCE: </a:t>
+            </a:r>
+            <a:r>
+              <a:rPr lang="en-US" sz="1400" dirty="0">
+                <a:solidFill>
+                  <a:srgbClr val="0070C0"/>
+                </a:solidFill>
+                <a:hlinkClick r:id="rId4">
+                  <a:extLst>
+                    <a:ext uri="{A12FA001-AC4F-418D-AE19-62706E023703}">
+                      <ahyp:hlinkClr xmlns:ahyp="http://schemas.microsoft.com/office/drawing/2018/hyperlinkcolor" val="tx"/>
+                    </a:ext>
+                  </a:extLst>
+                </a:hlinkClick>
+              </a:rPr>
+              <a:t>https://www.orlandoairports.net/press/2018/09/18/passenger-traffic-numbers-continued-record-pace-in-july-at-orlando-international-airport/</a:t>
+            </a:r>
+            <a:endParaRPr lang="en-US" sz="1400" dirty="0">
+              <a:solidFill>
+                <a:srgbClr val="0070C0"/>
+              </a:solidFill>
+            </a:endParaRPr>
+          </a:p>
+          <a:p>
+            <a:endParaRPr lang="en-US" dirty="0"/>
+          </a:p>
+          <a:p>
+            <a:pPr marL="342900" indent="-342900">
+              <a:buFont typeface="+mj-lt"/>
+              <a:buAutoNum type="arabicPeriod" startAt="2"/>
+            </a:pPr>
+            <a:r>
+              <a:rPr lang="en-US" dirty="0"/>
+              <a:t>There is approximately a 7% increase in the number of flights delayed between the two date ranges, but insufficient information to suggest that this is due to the government shutdown. This is complex because there are several variables which may or may not contribute to this increase. Publications list several factors that may be contributors.</a:t>
+            </a:r>
+          </a:p>
+          <a:p>
+            <a:pPr marL="342900" indent="-342900">
+              <a:buFont typeface="+mj-lt"/>
+              <a:buAutoNum type="arabicPeriod" startAt="2"/>
+            </a:pPr>
+            <a:endParaRPr lang="en-US" dirty="0"/>
+          </a:p>
+          <a:p>
+            <a:pPr marL="342900" indent="-342900">
+              <a:buFont typeface="+mj-lt"/>
+              <a:buAutoNum type="arabicPeriod" startAt="2"/>
+            </a:pPr>
+            <a:r>
+              <a:rPr lang="en-US" dirty="0"/>
+              <a:t>There is however, a significant increase in the number of flights delayed when comparing the final weeks of both date ranges. In fact, the </a:t>
+            </a:r>
+            <a:r>
+              <a:rPr lang="en-US" u="sng" dirty="0"/>
+              <a:t>final week of the government shutdown period exhibits double the number of delayed flights </a:t>
+            </a:r>
+            <a:r>
+              <a:rPr lang="en-US" dirty="0"/>
+              <a:t>compared with the same week of the previous year. This definitely requires deeper investigation.   </a:t>
+            </a:r>
+          </a:p>
+        </p:txBody>
+      </p:sp>
+    </p:spTree>
+    <p:extLst>
+      <p:ext uri="{BB962C8B-B14F-4D97-AF65-F5344CB8AC3E}">
+        <p14:creationId xmlns:p14="http://schemas.microsoft.com/office/powerpoint/2010/main" val="27845538"/>
+      </p:ext>
+    </p:extLst>
+  </p:cSld>
+  <p:clrMapOvr>
+    <a:masterClrMapping/>
+  </p:clrMapOvr>
+</p:sld>
+</file>
+
+<file path=ppt/slides/slide14.xml><?xml version="1.0" encoding="utf-8"?>
+<p:sld xmlns:a="http://schemas.openxmlformats.org/drawingml/2006/main" xmlns:r="http://schemas.openxmlformats.org/officeDocument/2006/relationships" xmlns:p="http://schemas.openxmlformats.org/presentationml/2006/main">
+  <p:cSld>
+    <p:bg>
+      <p:bgPr>
+        <a:gradFill>
+          <a:gsLst>
+            <a:gs pos="0">
+              <a:schemeClr val="accent1">
+                <a:lumMod val="5000"/>
+                <a:lumOff val="95000"/>
+              </a:schemeClr>
+            </a:gs>
+            <a:gs pos="81000">
+              <a:schemeClr val="accent1">
+                <a:lumMod val="45000"/>
+                <a:lumOff val="55000"/>
+              </a:schemeClr>
+            </a:gs>
+            <a:gs pos="83000">
+              <a:schemeClr val="accent1">
+                <a:lumMod val="45000"/>
+                <a:lumOff val="55000"/>
+              </a:schemeClr>
+            </a:gs>
+            <a:gs pos="100000">
+              <a:schemeClr val="accent1">
+                <a:lumMod val="30000"/>
+                <a:lumOff val="70000"/>
+              </a:schemeClr>
+            </a:gs>
+          </a:gsLst>
+          <a:lin ang="5400000" scaled="1"/>
+        </a:gradFill>
+        <a:effectLst/>
+      </p:bgPr>
+    </p:bg>
+    <p:spTree>
+      <p:nvGrpSpPr>
+        <p:cNvPr id="1" name=""/>
+        <p:cNvGrpSpPr/>
+        <p:nvPr/>
+      </p:nvGrpSpPr>
+      <p:grpSpPr>
+        <a:xfrm>
+          <a:off x="0" y="0"/>
+          <a:ext cx="0" cy="0"/>
+          <a:chOff x="0" y="0"/>
+          <a:chExt cx="0" cy="0"/>
+        </a:xfrm>
+      </p:grpSpPr>
+      <p:sp useBgFill="1">
+        <p:nvSpPr>
+          <p:cNvPr id="9" name="Rectangle 8">
+            <a:extLst>
+              <a:ext uri="{FF2B5EF4-FFF2-40B4-BE49-F238E27FC236}">
+                <a16:creationId xmlns:a16="http://schemas.microsoft.com/office/drawing/2014/main" id="{4281BC32-FF58-4898-A6B5-7B3D059BCEB0}"/>
+              </a:ext>
+              <a:ext uri="{C183D7F6-B498-43B3-948B-1728B52AA6E4}">
+                <adec:decorative xmlns:adec="http://schemas.microsoft.com/office/drawing/2017/decorative" val="1"/>
+              </a:ext>
+            </a:extLst>
+          </p:cNvPr>
+          <p:cNvSpPr>
+            <a:spLocks noGrp="1" noRot="1" noChangeAspect="1" noMove="1" noResize="1" noEditPoints="1" noAdjustHandles="1" noChangeArrowheads="1" noChangeShapeType="1" noTextEdit="1"/>
+          </p:cNvSpPr>
+          <p:nvPr>
+            <p:extLst>
+              <p:ext uri="{386F3935-93C4-4BCD-93E2-E3B085C9AB24}">
+                <p16:designElem xmlns:p16="http://schemas.microsoft.com/office/powerpoint/2015/main" val="1"/>
+              </p:ext>
+            </p:extLst>
+          </p:nvPr>
+        </p:nvSpPr>
+        <p:spPr>
+          <a:xfrm>
+            <a:off x="0" y="0"/>
+            <a:ext cx="12192000" cy="6858000"/>
+          </a:xfrm>
+          <a:prstGeom prst="rect">
+            <a:avLst/>
+          </a:prstGeom>
+          <a:ln>
+            <a:noFill/>
+          </a:ln>
+        </p:spPr>
+        <p:style>
+          <a:lnRef idx="2">
+            <a:schemeClr val="accent1">
+              <a:shade val="50000"/>
+            </a:schemeClr>
+          </a:lnRef>
+          <a:fillRef idx="1">
+            <a:schemeClr val="accent1"/>
+          </a:fillRef>
+          <a:effectRef idx="0">
+            <a:schemeClr val="accent1"/>
+          </a:effectRef>
+          <a:fontRef idx="minor">
+            <a:schemeClr val="lt1"/>
+          </a:fontRef>
+        </p:style>
+        <p:txBody>
+          <a:bodyPr rtlCol="0" anchor="ctr"/>
+          <a:lstStyle/>
+          <a:p>
+            <a:pPr algn="ctr"/>
+            <a:endParaRPr lang="en-US"/>
+          </a:p>
+        </p:txBody>
+      </p:sp>
+      <p:sp>
+        <p:nvSpPr>
+          <p:cNvPr id="11" name="Rectangle 10">
+            <a:extLst>
+              <a:ext uri="{FF2B5EF4-FFF2-40B4-BE49-F238E27FC236}">
+                <a16:creationId xmlns:a16="http://schemas.microsoft.com/office/drawing/2014/main" id="{0D614406-135F-4875-9C87-53822CB19ABB}"/>
+              </a:ext>
+              <a:ext uri="{C183D7F6-B498-43B3-948B-1728B52AA6E4}">
+                <adec:decorative xmlns:adec="http://schemas.microsoft.com/office/drawing/2017/decorative" val="1"/>
+              </a:ext>
+            </a:extLst>
+          </p:cNvPr>
+          <p:cNvSpPr>
+            <a:spLocks noGrp="1" noRot="1" noChangeAspect="1" noMove="1" noResize="1" noEditPoints="1" noAdjustHandles="1" noChangeArrowheads="1" noChangeShapeType="1" noTextEdit="1"/>
+          </p:cNvSpPr>
+          <p:nvPr>
+            <p:extLst>
+              <p:ext uri="{386F3935-93C4-4BCD-93E2-E3B085C9AB24}">
+                <p16:designElem xmlns:p16="http://schemas.microsoft.com/office/powerpoint/2015/main" val="1"/>
+              </p:ext>
+            </p:extLst>
+          </p:nvPr>
+        </p:nvSpPr>
+        <p:spPr>
+          <a:xfrm>
+            <a:off x="0" y="0"/>
+            <a:ext cx="12191999" cy="2285999"/>
+          </a:xfrm>
+          <a:prstGeom prst="rect">
+            <a:avLst/>
+          </a:prstGeom>
+          <a:solidFill>
+            <a:schemeClr val="tx1"/>
+          </a:solidFill>
+          <a:ln>
+            <a:noFill/>
+          </a:ln>
+        </p:spPr>
+        <p:style>
+          <a:lnRef idx="2">
+            <a:schemeClr val="accent1">
+              <a:shade val="50000"/>
+            </a:schemeClr>
+          </a:lnRef>
+          <a:fillRef idx="1">
+            <a:schemeClr val="accent1"/>
+          </a:fillRef>
+          <a:effectRef idx="0">
+            <a:schemeClr val="accent1"/>
+          </a:effectRef>
+          <a:fontRef idx="minor">
+            <a:schemeClr val="lt1"/>
+          </a:fontRef>
+        </p:style>
+        <p:txBody>
+          <a:bodyPr rtlCol="0" anchor="ctr"/>
+          <a:lstStyle/>
+          <a:p>
+            <a:pPr algn="ctr"/>
+            <a:endParaRPr lang="en-US"/>
+          </a:p>
+        </p:txBody>
+      </p:sp>
+      <p:sp>
+        <p:nvSpPr>
+          <p:cNvPr id="2" name="Title 1"/>
           <p:cNvSpPr>
             <a:spLocks noGrp="1"/>
           </p:cNvSpPr>
           <p:nvPr>
-            <p:ph idx="1"/>
+            <p:ph type="title"/>
           </p:nvPr>
         </p:nvSpPr>
         <p:spPr>
           <a:xfrm>
-            <a:off x="960119" y="2942252"/>
-            <a:ext cx="10266681" cy="3172409"/>
+            <a:off x="76200" y="221915"/>
+            <a:ext cx="7169753" cy="1232750"/>
           </a:xfrm>
         </p:spPr>
         <p:txBody>
-          <a:bodyPr>
+          <a:bodyPr anchor="b">
             <a:normAutofit/>
           </a:bodyPr>
           <a:lstStyle/>
           <a:p>
-            <a:endParaRPr/>
+            <a:pPr algn="l"/>
+            <a:r>
+              <a:rPr lang="en-US" sz="3900" dirty="0">
+                <a:solidFill>
+                  <a:schemeClr val="bg1"/>
+                </a:solidFill>
+              </a:rPr>
+              <a:t>Findings and conclusions</a:t>
+            </a:r>
           </a:p>
         </p:txBody>
+      </p:sp>
+      <p:cxnSp>
+        <p:nvCxnSpPr>
+          <p:cNvPr id="13" name="Straight Connector 12">
+            <a:extLst>
+              <a:ext uri="{FF2B5EF4-FFF2-40B4-BE49-F238E27FC236}">
+                <a16:creationId xmlns:a16="http://schemas.microsoft.com/office/drawing/2014/main" id="{C6C21149-7D17-44C2-AFB6-4D931DC55FB1}"/>
+              </a:ext>
+              <a:ext uri="{C183D7F6-B498-43B3-948B-1728B52AA6E4}">
+                <adec:decorative xmlns:adec="http://schemas.microsoft.com/office/drawing/2017/decorative" val="1"/>
+              </a:ext>
+            </a:extLst>
+          </p:cNvPr>
+          <p:cNvCxnSpPr>
+            <a:cxnSpLocks noGrp="1" noRot="1" noChangeAspect="1" noMove="1" noResize="1" noEditPoints="1" noAdjustHandles="1" noChangeArrowheads="1" noChangeShapeType="1"/>
+          </p:cNvCxnSpPr>
+          <p:nvPr>
+            <p:extLst>
+              <p:ext uri="{386F3935-93C4-4BCD-93E2-E3B085C9AB24}">
+                <p16:designElem xmlns:p16="http://schemas.microsoft.com/office/powerpoint/2015/main" val="1"/>
+              </p:ext>
+            </p:extLst>
+          </p:nvPr>
+        </p:nvCxnSpPr>
+        <p:spPr>
+          <a:xfrm>
+            <a:off x="0" y="1676579"/>
+            <a:ext cx="8129873" cy="6020"/>
+          </a:xfrm>
+          <a:prstGeom prst="line">
+            <a:avLst/>
+          </a:prstGeom>
+          <a:ln w="25400">
+            <a:solidFill>
+              <a:schemeClr val="bg1"/>
+            </a:solidFill>
+          </a:ln>
+        </p:spPr>
+        <p:style>
+          <a:lnRef idx="1">
+            <a:schemeClr val="accent1"/>
+          </a:lnRef>
+          <a:fillRef idx="0">
+            <a:schemeClr val="accent1"/>
+          </a:fillRef>
+          <a:effectRef idx="0">
+            <a:schemeClr val="accent1"/>
+          </a:effectRef>
+          <a:fontRef idx="minor">
+            <a:schemeClr val="tx1"/>
+          </a:fontRef>
+        </p:style>
+      </p:cxnSp>
+      <p:sp>
+        <p:nvSpPr>
+          <p:cNvPr id="15" name="Freeform 6">
+            <a:extLst>
+              <a:ext uri="{FF2B5EF4-FFF2-40B4-BE49-F238E27FC236}">
+                <a16:creationId xmlns:a16="http://schemas.microsoft.com/office/drawing/2014/main" id="{C2E5FCF0-567A-448C-A6E3-920BFC702C2F}"/>
+              </a:ext>
+              <a:ext uri="{C183D7F6-B498-43B3-948B-1728B52AA6E4}">
+                <adec:decorative xmlns:adec="http://schemas.microsoft.com/office/drawing/2017/decorative" val="1"/>
+              </a:ext>
+            </a:extLst>
+          </p:cNvPr>
+          <p:cNvSpPr>
+            <a:spLocks noGrp="1" noRot="1" noChangeAspect="1" noMove="1" noResize="1" noEditPoints="1" noAdjustHandles="1" noChangeArrowheads="1" noChangeShapeType="1" noTextEdit="1"/>
+          </p:cNvSpPr>
+          <p:nvPr>
+            <p:extLst>
+              <p:ext uri="{386F3935-93C4-4BCD-93E2-E3B085C9AB24}">
+                <p16:designElem xmlns:p16="http://schemas.microsoft.com/office/powerpoint/2015/main" val="1"/>
+              </p:ext>
+            </p:extLst>
+          </p:nvPr>
+        </p:nvSpPr>
+        <p:spPr bwMode="auto">
+          <a:xfrm>
+            <a:off x="11784011" y="938535"/>
+            <a:ext cx="407988" cy="819150"/>
+          </a:xfrm>
+          <a:custGeom>
+            <a:avLst/>
+            <a:gdLst/>
+            <a:ahLst/>
+            <a:cxnLst/>
+            <a:rect l="0" t="0" r="r" b="b"/>
+            <a:pathLst>
+              <a:path w="1799" h="3612">
+                <a:moveTo>
+                  <a:pt x="1799" y="0"/>
+                </a:moveTo>
+                <a:lnTo>
+                  <a:pt x="1799" y="3612"/>
+                </a:lnTo>
+                <a:lnTo>
+                  <a:pt x="1686" y="3609"/>
+                </a:lnTo>
+                <a:lnTo>
+                  <a:pt x="1574" y="3598"/>
+                </a:lnTo>
+                <a:lnTo>
+                  <a:pt x="1464" y="3581"/>
+                </a:lnTo>
+                <a:lnTo>
+                  <a:pt x="1357" y="3557"/>
+                </a:lnTo>
+                <a:lnTo>
+                  <a:pt x="1251" y="3527"/>
+                </a:lnTo>
+                <a:lnTo>
+                  <a:pt x="1150" y="3490"/>
+                </a:lnTo>
+                <a:lnTo>
+                  <a:pt x="1050" y="3448"/>
+                </a:lnTo>
+                <a:lnTo>
+                  <a:pt x="953" y="3401"/>
+                </a:lnTo>
+                <a:lnTo>
+                  <a:pt x="860" y="3347"/>
+                </a:lnTo>
+                <a:lnTo>
+                  <a:pt x="771" y="3289"/>
+                </a:lnTo>
+                <a:lnTo>
+                  <a:pt x="686" y="3224"/>
+                </a:lnTo>
+                <a:lnTo>
+                  <a:pt x="604" y="3156"/>
+                </a:lnTo>
+                <a:lnTo>
+                  <a:pt x="527" y="3083"/>
+                </a:lnTo>
+                <a:lnTo>
+                  <a:pt x="454" y="3005"/>
+                </a:lnTo>
+                <a:lnTo>
+                  <a:pt x="386" y="2923"/>
+                </a:lnTo>
+                <a:lnTo>
+                  <a:pt x="323" y="2838"/>
+                </a:lnTo>
+                <a:lnTo>
+                  <a:pt x="265" y="2748"/>
+                </a:lnTo>
+                <a:lnTo>
+                  <a:pt x="211" y="2655"/>
+                </a:lnTo>
+                <a:lnTo>
+                  <a:pt x="163" y="2559"/>
+                </a:lnTo>
+                <a:lnTo>
+                  <a:pt x="121" y="2459"/>
+                </a:lnTo>
+                <a:lnTo>
+                  <a:pt x="85" y="2356"/>
+                </a:lnTo>
+                <a:lnTo>
+                  <a:pt x="55" y="2251"/>
+                </a:lnTo>
+                <a:lnTo>
+                  <a:pt x="32" y="2143"/>
+                </a:lnTo>
+                <a:lnTo>
+                  <a:pt x="14" y="2033"/>
+                </a:lnTo>
+                <a:lnTo>
+                  <a:pt x="4" y="1920"/>
+                </a:lnTo>
+                <a:lnTo>
+                  <a:pt x="0" y="1806"/>
+                </a:lnTo>
+                <a:lnTo>
+                  <a:pt x="4" y="1692"/>
+                </a:lnTo>
+                <a:lnTo>
+                  <a:pt x="14" y="1580"/>
+                </a:lnTo>
+                <a:lnTo>
+                  <a:pt x="32" y="1469"/>
+                </a:lnTo>
+                <a:lnTo>
+                  <a:pt x="55" y="1362"/>
+                </a:lnTo>
+                <a:lnTo>
+                  <a:pt x="85" y="1256"/>
+                </a:lnTo>
+                <a:lnTo>
+                  <a:pt x="121" y="1154"/>
+                </a:lnTo>
+                <a:lnTo>
+                  <a:pt x="163" y="1054"/>
+                </a:lnTo>
+                <a:lnTo>
+                  <a:pt x="211" y="958"/>
+                </a:lnTo>
+                <a:lnTo>
+                  <a:pt x="265" y="864"/>
+                </a:lnTo>
+                <a:lnTo>
+                  <a:pt x="323" y="774"/>
+                </a:lnTo>
+                <a:lnTo>
+                  <a:pt x="386" y="689"/>
+                </a:lnTo>
+                <a:lnTo>
+                  <a:pt x="454" y="607"/>
+                </a:lnTo>
+                <a:lnTo>
+                  <a:pt x="527" y="529"/>
+                </a:lnTo>
+                <a:lnTo>
+                  <a:pt x="604" y="456"/>
+                </a:lnTo>
+                <a:lnTo>
+                  <a:pt x="686" y="388"/>
+                </a:lnTo>
+                <a:lnTo>
+                  <a:pt x="771" y="325"/>
+                </a:lnTo>
+                <a:lnTo>
+                  <a:pt x="860" y="266"/>
+                </a:lnTo>
+                <a:lnTo>
+                  <a:pt x="953" y="212"/>
+                </a:lnTo>
+                <a:lnTo>
+                  <a:pt x="1050" y="164"/>
+                </a:lnTo>
+                <a:lnTo>
+                  <a:pt x="1150" y="122"/>
+                </a:lnTo>
+                <a:lnTo>
+                  <a:pt x="1251" y="85"/>
+                </a:lnTo>
+                <a:lnTo>
+                  <a:pt x="1357" y="55"/>
+                </a:lnTo>
+                <a:lnTo>
+                  <a:pt x="1464" y="32"/>
+                </a:lnTo>
+                <a:lnTo>
+                  <a:pt x="1574" y="14"/>
+                </a:lnTo>
+                <a:lnTo>
+                  <a:pt x="1686" y="5"/>
+                </a:lnTo>
+                <a:lnTo>
+                  <a:pt x="1799" y="0"/>
+                </a:lnTo>
+                <a:close/>
+              </a:path>
+            </a:pathLst>
+          </a:custGeom>
+          <a:solidFill>
+            <a:schemeClr val="bg2"/>
+          </a:solidFill>
+          <a:ln w="0">
+            <a:noFill/>
+            <a:prstDash val="solid"/>
+            <a:round/>
+            <a:headEnd/>
+            <a:tailEnd/>
+          </a:ln>
+        </p:spPr>
       </p:sp>
       <p:pic>
         <p:nvPicPr>
@@ -15716,10 +16362,139 @@
           </a:extLst>
         </p:spPr>
       </p:pic>
+      <p:sp>
+        <p:nvSpPr>
+          <p:cNvPr id="4" name="Rectangle 3">
+            <a:extLst>
+              <a:ext uri="{FF2B5EF4-FFF2-40B4-BE49-F238E27FC236}">
+                <a16:creationId xmlns:a16="http://schemas.microsoft.com/office/drawing/2014/main" id="{F1293546-5345-49B9-B042-1CC6074EDE38}"/>
+              </a:ext>
+            </a:extLst>
+          </p:cNvPr>
+          <p:cNvSpPr/>
+          <p:nvPr/>
+        </p:nvSpPr>
+        <p:spPr>
+          <a:xfrm>
+            <a:off x="0" y="2285999"/>
+            <a:ext cx="12191998" cy="2246769"/>
+          </a:xfrm>
+          <a:prstGeom prst="rect">
+            <a:avLst/>
+          </a:prstGeom>
+        </p:spPr>
+        <p:txBody>
+          <a:bodyPr wrap="square">
+            <a:spAutoFit/>
+          </a:bodyPr>
+          <a:lstStyle/>
+          <a:p>
+            <a:r>
+              <a:rPr lang="en-US" b="1" dirty="0"/>
+              <a:t>STUFF</a:t>
+            </a:r>
+          </a:p>
+          <a:p>
+            <a:pPr marL="342900" indent="-342900">
+              <a:buFont typeface="+mj-lt"/>
+              <a:buAutoNum type="arabicPeriod"/>
+            </a:pPr>
+            <a:r>
+              <a:rPr lang="en-US" dirty="0"/>
+              <a:t>More stuff.</a:t>
+            </a:r>
+          </a:p>
+          <a:p>
+            <a:r>
+              <a:rPr lang="en-US" b="1" dirty="0"/>
+              <a:t>	</a:t>
+            </a:r>
+            <a:r>
+              <a:rPr lang="en-US" sz="1400" b="1" dirty="0"/>
+              <a:t>SOURCE: </a:t>
+            </a:r>
+            <a:r>
+              <a:rPr lang="en-US" sz="1400" dirty="0">
+                <a:solidFill>
+                  <a:srgbClr val="0070C0"/>
+                </a:solidFill>
+                <a:hlinkClick r:id="rId3">
+                  <a:extLst>
+                    <a:ext uri="{A12FA001-AC4F-418D-AE19-62706E023703}">
+                      <ahyp:hlinkClr xmlns:ahyp="http://schemas.microsoft.com/office/drawing/2018/hyperlinkcolor" val="tx"/>
+                    </a:ext>
+                  </a:extLst>
+                </a:hlinkClick>
+              </a:rPr>
+              <a:t>https://www.atl.com/wp-content/uploads/2018/12/ATL-Traffic-Report-Nov-2018.pdf</a:t>
+            </a:r>
+            <a:r>
+              <a:rPr lang="en-US" sz="1400" dirty="0"/>
+              <a:t> </a:t>
+            </a:r>
+          </a:p>
+          <a:p>
+            <a:r>
+              <a:rPr lang="en-US" sz="1400" b="1" dirty="0"/>
+              <a:t>	SOURCE: </a:t>
+            </a:r>
+            <a:r>
+              <a:rPr lang="en-US" sz="1400" dirty="0">
+                <a:solidFill>
+                  <a:srgbClr val="0070C0"/>
+                </a:solidFill>
+                <a:hlinkClick r:id="rId4">
+                  <a:extLst>
+                    <a:ext uri="{A12FA001-AC4F-418D-AE19-62706E023703}">
+                      <ahyp:hlinkClr xmlns:ahyp="http://schemas.microsoft.com/office/drawing/2018/hyperlinkcolor" val="tx"/>
+                    </a:ext>
+                  </a:extLst>
+                </a:hlinkClick>
+              </a:rPr>
+              <a:t>https://www.orlandoairports.net/press/2018/09/18/passenger-traffic-numbers-continued-record-pace-in-july-at-orlando-international-airport/</a:t>
+            </a:r>
+            <a:endParaRPr lang="en-US" sz="1400" dirty="0">
+              <a:solidFill>
+                <a:srgbClr val="0070C0"/>
+              </a:solidFill>
+            </a:endParaRPr>
+          </a:p>
+          <a:p>
+            <a:endParaRPr lang="en-US" dirty="0"/>
+          </a:p>
+          <a:p>
+            <a:pPr marL="342900" indent="-342900">
+              <a:buFont typeface="+mj-lt"/>
+              <a:buAutoNum type="arabicPeriod" startAt="2"/>
+            </a:pPr>
+            <a:r>
+              <a:rPr lang="en-US" dirty="0"/>
+              <a:t>Even more stuff.</a:t>
+            </a:r>
+          </a:p>
+          <a:p>
+            <a:pPr marL="342900" indent="-342900">
+              <a:buFont typeface="+mj-lt"/>
+              <a:buAutoNum type="arabicPeriod" startAt="2"/>
+            </a:pPr>
+            <a:endParaRPr lang="en-US" dirty="0"/>
+          </a:p>
+          <a:p>
+            <a:pPr marL="342900" indent="-342900">
+              <a:buFont typeface="+mj-lt"/>
+              <a:buAutoNum type="arabicPeriod" startAt="2"/>
+            </a:pPr>
+            <a:r>
+              <a:rPr lang="en-US" dirty="0"/>
+              <a:t>Really interesting prediction!.   </a:t>
+            </a:r>
+          </a:p>
+        </p:txBody>
+      </p:sp>
     </p:spTree>
     <p:extLst>
       <p:ext uri="{BB962C8B-B14F-4D97-AF65-F5344CB8AC3E}">
-        <p14:creationId xmlns:p14="http://schemas.microsoft.com/office/powerpoint/2010/main" val="27845538"/>
+        <p14:creationId xmlns:p14="http://schemas.microsoft.com/office/powerpoint/2010/main" val="2123433340"/>
       </p:ext>
     </p:extLst>
   </p:cSld>
@@ -15729,7 +16504,7 @@
 </p:sld>
 </file>
 
-<file path=ppt/slides/slide14.xml><?xml version="1.0" encoding="utf-8"?>
+<file path=ppt/slides/slide15.xml><?xml version="1.0" encoding="utf-8"?>
 <p:sld xmlns:a="http://schemas.openxmlformats.org/drawingml/2006/main" xmlns:r="http://schemas.openxmlformats.org/officeDocument/2006/relationships" xmlns:p="http://schemas.openxmlformats.org/presentationml/2006/main">
   <p:cSld>
     <p:bg>

</xml_diff>